<commit_message>
cleaned up notebook folders
</commit_message>
<xml_diff>
--- a/concept/kreativkopf_concept_draft.pptx
+++ b/concept/kreativkopf_concept_draft.pptx
@@ -261,7 +261,7 @@
           <a:p>
             <a:fld id="{AD759C05-7800-D742-A36D-EDF88F504BCA}" type="datetimeFigureOut">
               <a:rPr lang="en-US" smtClean="0"/>
-              <a:t>1/29/21</a:t>
+              <a:t>3/10/21</a:t>
             </a:fld>
             <a:endParaRPr lang="en-US"/>
           </a:p>
@@ -461,7 +461,7 @@
           <a:p>
             <a:fld id="{AD759C05-7800-D742-A36D-EDF88F504BCA}" type="datetimeFigureOut">
               <a:rPr lang="en-US" smtClean="0"/>
-              <a:t>1/29/21</a:t>
+              <a:t>3/10/21</a:t>
             </a:fld>
             <a:endParaRPr lang="en-US"/>
           </a:p>
@@ -671,7 +671,7 @@
           <a:p>
             <a:fld id="{AD759C05-7800-D742-A36D-EDF88F504BCA}" type="datetimeFigureOut">
               <a:rPr lang="en-US" smtClean="0"/>
-              <a:t>1/29/21</a:t>
+              <a:t>3/10/21</a:t>
             </a:fld>
             <a:endParaRPr lang="en-US"/>
           </a:p>
@@ -871,7 +871,7 @@
           <a:p>
             <a:fld id="{AD759C05-7800-D742-A36D-EDF88F504BCA}" type="datetimeFigureOut">
               <a:rPr lang="en-US" smtClean="0"/>
-              <a:t>1/29/21</a:t>
+              <a:t>3/10/21</a:t>
             </a:fld>
             <a:endParaRPr lang="en-US"/>
           </a:p>
@@ -1147,7 +1147,7 @@
           <a:p>
             <a:fld id="{AD759C05-7800-D742-A36D-EDF88F504BCA}" type="datetimeFigureOut">
               <a:rPr lang="en-US" smtClean="0"/>
-              <a:t>1/29/21</a:t>
+              <a:t>3/10/21</a:t>
             </a:fld>
             <a:endParaRPr lang="en-US"/>
           </a:p>
@@ -1415,7 +1415,7 @@
           <a:p>
             <a:fld id="{AD759C05-7800-D742-A36D-EDF88F504BCA}" type="datetimeFigureOut">
               <a:rPr lang="en-US" smtClean="0"/>
-              <a:t>1/29/21</a:t>
+              <a:t>3/10/21</a:t>
             </a:fld>
             <a:endParaRPr lang="en-US"/>
           </a:p>
@@ -1830,7 +1830,7 @@
           <a:p>
             <a:fld id="{AD759C05-7800-D742-A36D-EDF88F504BCA}" type="datetimeFigureOut">
               <a:rPr lang="en-US" smtClean="0"/>
-              <a:t>1/29/21</a:t>
+              <a:t>3/10/21</a:t>
             </a:fld>
             <a:endParaRPr lang="en-US"/>
           </a:p>
@@ -1972,7 +1972,7 @@
           <a:p>
             <a:fld id="{AD759C05-7800-D742-A36D-EDF88F504BCA}" type="datetimeFigureOut">
               <a:rPr lang="en-US" smtClean="0"/>
-              <a:t>1/29/21</a:t>
+              <a:t>3/10/21</a:t>
             </a:fld>
             <a:endParaRPr lang="en-US"/>
           </a:p>
@@ -2085,7 +2085,7 @@
           <a:p>
             <a:fld id="{AD759C05-7800-D742-A36D-EDF88F504BCA}" type="datetimeFigureOut">
               <a:rPr lang="en-US" smtClean="0"/>
-              <a:t>1/29/21</a:t>
+              <a:t>3/10/21</a:t>
             </a:fld>
             <a:endParaRPr lang="en-US"/>
           </a:p>
@@ -2398,7 +2398,7 @@
           <a:p>
             <a:fld id="{AD759C05-7800-D742-A36D-EDF88F504BCA}" type="datetimeFigureOut">
               <a:rPr lang="en-US" smtClean="0"/>
-              <a:t>1/29/21</a:t>
+              <a:t>3/10/21</a:t>
             </a:fld>
             <a:endParaRPr lang="en-US"/>
           </a:p>
@@ -2687,7 +2687,7 @@
           <a:p>
             <a:fld id="{AD759C05-7800-D742-A36D-EDF88F504BCA}" type="datetimeFigureOut">
               <a:rPr lang="en-US" smtClean="0"/>
-              <a:t>1/29/21</a:t>
+              <a:t>3/10/21</a:t>
             </a:fld>
             <a:endParaRPr lang="en-US"/>
           </a:p>
@@ -2930,7 +2930,7 @@
           <a:p>
             <a:fld id="{AD759C05-7800-D742-A36D-EDF88F504BCA}" type="datetimeFigureOut">
               <a:rPr lang="en-US" smtClean="0"/>
-              <a:t>1/29/21</a:t>
+              <a:t>3/10/21</a:t>
             </a:fld>
             <a:endParaRPr lang="en-US"/>
           </a:p>
@@ -3374,7 +3374,7 @@
         </p:nvSpPr>
         <p:spPr>
           <a:xfrm>
-            <a:off x="679453" y="1860607"/>
+            <a:off x="679453" y="2105561"/>
             <a:ext cx="10833094" cy="2646878"/>
           </a:xfrm>
           <a:prstGeom prst="rect">
@@ -3424,54 +3424,6 @@
                 <a:cs typeface="Arial Unicode MS" panose="020B0604020202020204" pitchFamily="34" charset="-128"/>
               </a:rPr>
               <a:t>KOPF</a:t>
-            </a:r>
-          </a:p>
-        </p:txBody>
-      </p:sp>
-      <p:sp>
-        <p:nvSpPr>
-          <p:cNvPr id="5" name="TextBox 4">
-            <a:extLst>
-              <a:ext uri="{FF2B5EF4-FFF2-40B4-BE49-F238E27FC236}">
-                <a16:creationId xmlns:a16="http://schemas.microsoft.com/office/drawing/2014/main" id="{5BB3A9F1-6D4C-F74A-8D5E-073EDD1265CE}"/>
-              </a:ext>
-            </a:extLst>
-          </p:cNvPr>
-          <p:cNvSpPr txBox="1"/>
-          <p:nvPr/>
-        </p:nvSpPr>
-        <p:spPr>
-          <a:xfrm>
-            <a:off x="755653" y="4025928"/>
-            <a:ext cx="11104322" cy="492443"/>
-          </a:xfrm>
-          <a:prstGeom prst="rect">
-            <a:avLst/>
-          </a:prstGeom>
-          <a:noFill/>
-        </p:spPr>
-        <p:txBody>
-          <a:bodyPr wrap="none" rtlCol="0">
-            <a:spAutoFit/>
-          </a:bodyPr>
-          <a:lstStyle/>
-          <a:p>
-            <a:r>
-              <a:rPr lang="en-US" sz="2500" spc="350" dirty="0">
-                <a:solidFill>
-                  <a:srgbClr val="FBFBFB"/>
-                </a:solidFill>
-                <a:effectLst>
-                  <a:outerShdw blurRad="50800" dist="38100" dir="5400000" algn="t" rotWithShape="0">
-                    <a:schemeClr val="bg1">
-                      <a:lumMod val="50000"/>
-                      <a:alpha val="40000"/>
-                    </a:schemeClr>
-                  </a:outerShdw>
-                </a:effectLst>
-                <a:latin typeface="Helvetica" pitchFamily="2" charset="0"/>
-              </a:rPr>
-              <a:t>Marketing Intelligence by kreativbox.io &amp; machinemind.io</a:t>
             </a:r>
           </a:p>
         </p:txBody>

</xml_diff>

<commit_message>
facebook ads notebook done
</commit_message>
<xml_diff>
--- a/concept/kreativkopf_concept_draft.pptx
+++ b/concept/kreativkopf_concept_draft.pptx
@@ -6,12 +6,13 @@
   </p:sldMasterIdLst>
   <p:sldIdLst>
     <p:sldId id="256" r:id="rId2"/>
-    <p:sldId id="257" r:id="rId3"/>
-    <p:sldId id="258" r:id="rId4"/>
-    <p:sldId id="259" r:id="rId5"/>
-    <p:sldId id="262" r:id="rId6"/>
-    <p:sldId id="260" r:id="rId7"/>
-    <p:sldId id="261" r:id="rId8"/>
+    <p:sldId id="263" r:id="rId3"/>
+    <p:sldId id="257" r:id="rId4"/>
+    <p:sldId id="258" r:id="rId5"/>
+    <p:sldId id="259" r:id="rId6"/>
+    <p:sldId id="262" r:id="rId7"/>
+    <p:sldId id="260" r:id="rId8"/>
+    <p:sldId id="261" r:id="rId9"/>
   </p:sldIdLst>
   <p:sldSz cx="12192000" cy="6858000"/>
   <p:notesSz cx="6858000" cy="9144000"/>
@@ -267,7 +268,7 @@
           <a:p>
             <a:fld id="{AD759C05-7800-D742-A36D-EDF88F504BCA}" type="datetimeFigureOut">
               <a:rPr lang="en-US" smtClean="0"/>
-              <a:t>3/12/21</a:t>
+              <a:t>3/25/21</a:t>
             </a:fld>
             <a:endParaRPr lang="en-US"/>
           </a:p>
@@ -467,7 +468,7 @@
           <a:p>
             <a:fld id="{AD759C05-7800-D742-A36D-EDF88F504BCA}" type="datetimeFigureOut">
               <a:rPr lang="en-US" smtClean="0"/>
-              <a:t>3/12/21</a:t>
+              <a:t>3/25/21</a:t>
             </a:fld>
             <a:endParaRPr lang="en-US"/>
           </a:p>
@@ -677,7 +678,7 @@
           <a:p>
             <a:fld id="{AD759C05-7800-D742-A36D-EDF88F504BCA}" type="datetimeFigureOut">
               <a:rPr lang="en-US" smtClean="0"/>
-              <a:t>3/12/21</a:t>
+              <a:t>3/25/21</a:t>
             </a:fld>
             <a:endParaRPr lang="en-US"/>
           </a:p>
@@ -877,7 +878,7 @@
           <a:p>
             <a:fld id="{AD759C05-7800-D742-A36D-EDF88F504BCA}" type="datetimeFigureOut">
               <a:rPr lang="en-US" smtClean="0"/>
-              <a:t>3/12/21</a:t>
+              <a:t>3/25/21</a:t>
             </a:fld>
             <a:endParaRPr lang="en-US"/>
           </a:p>
@@ -1153,7 +1154,7 @@
           <a:p>
             <a:fld id="{AD759C05-7800-D742-A36D-EDF88F504BCA}" type="datetimeFigureOut">
               <a:rPr lang="en-US" smtClean="0"/>
-              <a:t>3/12/21</a:t>
+              <a:t>3/25/21</a:t>
             </a:fld>
             <a:endParaRPr lang="en-US"/>
           </a:p>
@@ -1421,7 +1422,7 @@
           <a:p>
             <a:fld id="{AD759C05-7800-D742-A36D-EDF88F504BCA}" type="datetimeFigureOut">
               <a:rPr lang="en-US" smtClean="0"/>
-              <a:t>3/12/21</a:t>
+              <a:t>3/25/21</a:t>
             </a:fld>
             <a:endParaRPr lang="en-US"/>
           </a:p>
@@ -1836,7 +1837,7 @@
           <a:p>
             <a:fld id="{AD759C05-7800-D742-A36D-EDF88F504BCA}" type="datetimeFigureOut">
               <a:rPr lang="en-US" smtClean="0"/>
-              <a:t>3/12/21</a:t>
+              <a:t>3/25/21</a:t>
             </a:fld>
             <a:endParaRPr lang="en-US"/>
           </a:p>
@@ -1978,7 +1979,7 @@
           <a:p>
             <a:fld id="{AD759C05-7800-D742-A36D-EDF88F504BCA}" type="datetimeFigureOut">
               <a:rPr lang="en-US" smtClean="0"/>
-              <a:t>3/12/21</a:t>
+              <a:t>3/25/21</a:t>
             </a:fld>
             <a:endParaRPr lang="en-US"/>
           </a:p>
@@ -2091,7 +2092,7 @@
           <a:p>
             <a:fld id="{AD759C05-7800-D742-A36D-EDF88F504BCA}" type="datetimeFigureOut">
               <a:rPr lang="en-US" smtClean="0"/>
-              <a:t>3/12/21</a:t>
+              <a:t>3/25/21</a:t>
             </a:fld>
             <a:endParaRPr lang="en-US"/>
           </a:p>
@@ -2404,7 +2405,7 @@
           <a:p>
             <a:fld id="{AD759C05-7800-D742-A36D-EDF88F504BCA}" type="datetimeFigureOut">
               <a:rPr lang="en-US" smtClean="0"/>
-              <a:t>3/12/21</a:t>
+              <a:t>3/25/21</a:t>
             </a:fld>
             <a:endParaRPr lang="en-US"/>
           </a:p>
@@ -2693,7 +2694,7 @@
           <a:p>
             <a:fld id="{AD759C05-7800-D742-A36D-EDF88F504BCA}" type="datetimeFigureOut">
               <a:rPr lang="en-US" smtClean="0"/>
-              <a:t>3/12/21</a:t>
+              <a:t>3/25/21</a:t>
             </a:fld>
             <a:endParaRPr lang="en-US"/>
           </a:p>
@@ -2936,7 +2937,7 @@
           <a:p>
             <a:fld id="{AD759C05-7800-D742-A36D-EDF88F504BCA}" type="datetimeFigureOut">
               <a:rPr lang="en-US" smtClean="0"/>
-              <a:t>3/12/21</a:t>
+              <a:t>3/25/21</a:t>
             </a:fld>
             <a:endParaRPr lang="en-US"/>
           </a:p>
@@ -3448,6 +3449,185 @@
 </file>
 
 <file path=ppt/slides/slide2.xml><?xml version="1.0" encoding="utf-8"?>
+<p:sld xmlns:a="http://schemas.openxmlformats.org/drawingml/2006/main" xmlns:r="http://schemas.openxmlformats.org/officeDocument/2006/relationships" xmlns:p="http://schemas.openxmlformats.org/presentationml/2006/main" show="0">
+  <p:cSld>
+    <p:bg>
+      <p:bgPr>
+        <a:pattFill prst="ltVert">
+          <a:fgClr>
+            <a:srgbClr val="1B1B1B"/>
+          </a:fgClr>
+          <a:bgClr>
+            <a:srgbClr val="0C0C0C"/>
+          </a:bgClr>
+        </a:pattFill>
+        <a:effectLst/>
+      </p:bgPr>
+    </p:bg>
+    <p:spTree>
+      <p:nvGrpSpPr>
+        <p:cNvPr id="1" name=""/>
+        <p:cNvGrpSpPr/>
+        <p:nvPr/>
+      </p:nvGrpSpPr>
+      <p:grpSpPr>
+        <a:xfrm>
+          <a:off x="0" y="0"/>
+          <a:ext cx="0" cy="0"/>
+          <a:chOff x="0" y="0"/>
+          <a:chExt cx="0" cy="0"/>
+        </a:xfrm>
+      </p:grpSpPr>
+      <p:grpSp>
+        <p:nvGrpSpPr>
+          <p:cNvPr id="2" name="Group 1">
+            <a:extLst>
+              <a:ext uri="{FF2B5EF4-FFF2-40B4-BE49-F238E27FC236}">
+                <a16:creationId xmlns:a16="http://schemas.microsoft.com/office/drawing/2014/main" id="{AE1F0236-7C2E-DD4D-96A1-6D6827B67E44}"/>
+              </a:ext>
+            </a:extLst>
+          </p:cNvPr>
+          <p:cNvGrpSpPr/>
+          <p:nvPr/>
+        </p:nvGrpSpPr>
+        <p:grpSpPr>
+          <a:xfrm>
+            <a:off x="2399398" y="913222"/>
+            <a:ext cx="9030604" cy="5185444"/>
+            <a:chOff x="2203455" y="690419"/>
+            <a:chExt cx="9030604" cy="5185444"/>
+          </a:xfrm>
+        </p:grpSpPr>
+        <p:sp>
+          <p:nvSpPr>
+            <p:cNvPr id="4" name="TextBox 3">
+              <a:extLst>
+                <a:ext uri="{FF2B5EF4-FFF2-40B4-BE49-F238E27FC236}">
+                  <a16:creationId xmlns:a16="http://schemas.microsoft.com/office/drawing/2014/main" id="{38C7DB3A-D3EC-484C-8EB9-55CC44C28D51}"/>
+                </a:ext>
+              </a:extLst>
+            </p:cNvPr>
+            <p:cNvSpPr txBox="1"/>
+            <p:nvPr/>
+          </p:nvSpPr>
+          <p:spPr>
+            <a:xfrm>
+              <a:off x="2268767" y="690419"/>
+              <a:ext cx="7130157" cy="2646878"/>
+            </a:xfrm>
+            <a:prstGeom prst="rect">
+              <a:avLst/>
+            </a:prstGeom>
+            <a:noFill/>
+          </p:spPr>
+          <p:txBody>
+            <a:bodyPr wrap="none" rtlCol="0">
+              <a:spAutoFit/>
+            </a:bodyPr>
+            <a:lstStyle/>
+            <a:p>
+              <a:r>
+                <a:rPr lang="en-US" sz="16600" b="1" spc="-320" dirty="0">
+                  <a:solidFill>
+                    <a:srgbClr val="FBFBFB"/>
+                  </a:solidFill>
+                  <a:effectLst>
+                    <a:outerShdw blurRad="50800" dist="38100" dir="5400000" algn="t" rotWithShape="0">
+                      <a:schemeClr val="bg1">
+                        <a:lumMod val="50000"/>
+                        <a:alpha val="40000"/>
+                      </a:schemeClr>
+                    </a:outerShdw>
+                  </a:effectLst>
+                  <a:latin typeface="Aharoni" panose="02010803020104030203" pitchFamily="2" charset="-79"/>
+                  <a:cs typeface="Aharoni" panose="02010803020104030203" pitchFamily="2" charset="-79"/>
+                </a:rPr>
+                <a:t>kreativ</a:t>
+              </a:r>
+              <a:endParaRPr lang="en-US" sz="10600" dirty="0">
+                <a:solidFill>
+                  <a:srgbClr val="FBFBFB"/>
+                </a:solidFill>
+                <a:effectLst>
+                  <a:outerShdw blurRad="50800" dist="38100" dir="5400000" algn="t" rotWithShape="0">
+                    <a:schemeClr val="bg1">
+                      <a:lumMod val="50000"/>
+                      <a:alpha val="40000"/>
+                    </a:schemeClr>
+                  </a:outerShdw>
+                </a:effectLst>
+                <a:latin typeface="Arial Unicode MS" panose="020B0604020202020204" pitchFamily="34" charset="-128"/>
+                <a:ea typeface="Arial Unicode MS" panose="020B0604020202020204" pitchFamily="34" charset="-128"/>
+                <a:cs typeface="Arial Unicode MS" panose="020B0604020202020204" pitchFamily="34" charset="-128"/>
+              </a:endParaRPr>
+            </a:p>
+          </p:txBody>
+        </p:sp>
+        <p:sp>
+          <p:nvSpPr>
+            <p:cNvPr id="3" name="TextBox 2">
+              <a:extLst>
+                <a:ext uri="{FF2B5EF4-FFF2-40B4-BE49-F238E27FC236}">
+                  <a16:creationId xmlns:a16="http://schemas.microsoft.com/office/drawing/2014/main" id="{C31C99A6-7FB7-4A49-BA4E-B738D17DCBEC}"/>
+                </a:ext>
+              </a:extLst>
+            </p:cNvPr>
+            <p:cNvSpPr txBox="1"/>
+            <p:nvPr/>
+          </p:nvSpPr>
+          <p:spPr>
+            <a:xfrm>
+              <a:off x="2203455" y="2551876"/>
+              <a:ext cx="9030604" cy="3323987"/>
+            </a:xfrm>
+            <a:prstGeom prst="rect">
+              <a:avLst/>
+            </a:prstGeom>
+            <a:noFill/>
+          </p:spPr>
+          <p:txBody>
+            <a:bodyPr wrap="square" rtlCol="0">
+              <a:spAutoFit/>
+            </a:bodyPr>
+            <a:lstStyle/>
+            <a:p>
+              <a:r>
+                <a:rPr lang="en-US" sz="20500" dirty="0">
+                  <a:solidFill>
+                    <a:srgbClr val="FBFBFB"/>
+                  </a:solidFill>
+                  <a:effectLst>
+                    <a:outerShdw blurRad="50800" dist="38100" dir="5400000" algn="t" rotWithShape="0">
+                      <a:schemeClr val="bg1">
+                        <a:lumMod val="50000"/>
+                        <a:alpha val="40000"/>
+                      </a:schemeClr>
+                    </a:outerShdw>
+                  </a:effectLst>
+                  <a:latin typeface="Arial Unicode MS" panose="020B0604020202020204" pitchFamily="34" charset="-128"/>
+                  <a:ea typeface="Arial Unicode MS" panose="020B0604020202020204" pitchFamily="34" charset="-128"/>
+                  <a:cs typeface="Arial Unicode MS" panose="020B0604020202020204" pitchFamily="34" charset="-128"/>
+                </a:rPr>
+                <a:t>KOPF</a:t>
+              </a:r>
+            </a:p>
+          </p:txBody>
+        </p:sp>
+      </p:grpSp>
+    </p:spTree>
+    <p:extLst>
+      <p:ext uri="{BB962C8B-B14F-4D97-AF65-F5344CB8AC3E}">
+        <p14:creationId xmlns:p14="http://schemas.microsoft.com/office/powerpoint/2010/main" val="1169908855"/>
+      </p:ext>
+    </p:extLst>
+  </p:cSld>
+  <p:clrMapOvr>
+    <a:masterClrMapping/>
+  </p:clrMapOvr>
+</p:sld>
+</file>
+
+<file path=ppt/slides/slide3.xml><?xml version="1.0" encoding="utf-8"?>
 <p:sld xmlns:a="http://schemas.openxmlformats.org/drawingml/2006/main" xmlns:r="http://schemas.openxmlformats.org/officeDocument/2006/relationships" xmlns:p="http://schemas.openxmlformats.org/presentationml/2006/main">
   <p:cSld>
     <p:bg>
@@ -3623,7 +3803,7 @@
 </p:sld>
 </file>
 
-<file path=ppt/slides/slide3.xml><?xml version="1.0" encoding="utf-8"?>
+<file path=ppt/slides/slide4.xml><?xml version="1.0" encoding="utf-8"?>
 <p:sld xmlns:a="http://schemas.openxmlformats.org/drawingml/2006/main" xmlns:r="http://schemas.openxmlformats.org/officeDocument/2006/relationships" xmlns:p="http://schemas.openxmlformats.org/presentationml/2006/main">
   <p:cSld>
     <p:bg>
@@ -3847,7 +4027,7 @@
 </p:sld>
 </file>
 
-<file path=ppt/slides/slide4.xml><?xml version="1.0" encoding="utf-8"?>
+<file path=ppt/slides/slide5.xml><?xml version="1.0" encoding="utf-8"?>
 <p:sld xmlns:a="http://schemas.openxmlformats.org/drawingml/2006/main" xmlns:r="http://schemas.openxmlformats.org/officeDocument/2006/relationships" xmlns:p="http://schemas.openxmlformats.org/presentationml/2006/main">
   <p:cSld>
     <p:bg>
@@ -3948,7 +4128,7 @@
 </p:sld>
 </file>
 
-<file path=ppt/slides/slide5.xml><?xml version="1.0" encoding="utf-8"?>
+<file path=ppt/slides/slide6.xml><?xml version="1.0" encoding="utf-8"?>
 <p:sld xmlns:a="http://schemas.openxmlformats.org/drawingml/2006/main" xmlns:r="http://schemas.openxmlformats.org/officeDocument/2006/relationships" xmlns:p="http://schemas.openxmlformats.org/presentationml/2006/main" show="0">
   <p:cSld>
     <p:spTree>
@@ -4926,7 +5106,7 @@
 </p:sld>
 </file>
 
-<file path=ppt/slides/slide6.xml><?xml version="1.0" encoding="utf-8"?>
+<file path=ppt/slides/slide7.xml><?xml version="1.0" encoding="utf-8"?>
 <p:sld xmlns:a="http://schemas.openxmlformats.org/drawingml/2006/main" xmlns:r="http://schemas.openxmlformats.org/officeDocument/2006/relationships" xmlns:p="http://schemas.openxmlformats.org/presentationml/2006/main">
   <p:cSld>
     <p:bg>
@@ -5043,7 +5223,7 @@
 </p:sld>
 </file>
 
-<file path=ppt/slides/slide7.xml><?xml version="1.0" encoding="utf-8"?>
+<file path=ppt/slides/slide8.xml><?xml version="1.0" encoding="utf-8"?>
 <p:sld xmlns:a="http://schemas.openxmlformats.org/drawingml/2006/main" xmlns:r="http://schemas.openxmlformats.org/officeDocument/2006/relationships" xmlns:p="http://schemas.openxmlformats.org/presentationml/2006/main">
   <p:cSld>
     <p:bg>

</xml_diff>